<commit_message>
Update Exam 01 Question 02 to remove references to the word slope
</commit_message>
<xml_diff>
--- a/exam1/Exam 1 Questions.pptx
+++ b/exam1/Exam 1 Questions.pptx
@@ -207,7 +207,7 @@
           <a:p>
             <a:fld id="{ECAAAD59-9D48-48BB-8EF4-798822FFF5A4}" type="datetimeFigureOut">
               <a:rPr lang="en-US" smtClean="0"/>
-              <a:t>5/31/2020</a:t>
+              <a:t>6/7/2020</a:t>
             </a:fld>
             <a:endParaRPr lang="en-US"/>
           </a:p>
@@ -605,7 +605,7 @@
           <a:p>
             <a:fld id="{1618355B-3634-4BC9-81D5-8538227F5BA8}" type="datetime1">
               <a:rPr lang="en-US" smtClean="0"/>
-              <a:t>5/31/2020</a:t>
+              <a:t>6/7/2020</a:t>
             </a:fld>
             <a:endParaRPr lang="en-US"/>
           </a:p>
@@ -784,7 +784,7 @@
           <a:p>
             <a:fld id="{2A2F89F1-48A6-4324-AFD1-3EC079BC4F99}" type="datetime1">
               <a:rPr lang="en-US" smtClean="0"/>
-              <a:t>5/31/2020</a:t>
+              <a:t>6/7/2020</a:t>
             </a:fld>
             <a:endParaRPr lang="en-US"/>
           </a:p>
@@ -973,7 +973,7 @@
           <a:p>
             <a:fld id="{A9F944BD-13BB-4F52-849A-274E079381D0}" type="datetime1">
               <a:rPr lang="en-US" smtClean="0"/>
-              <a:t>5/31/2020</a:t>
+              <a:t>6/7/2020</a:t>
             </a:fld>
             <a:endParaRPr lang="en-US"/>
           </a:p>
@@ -1152,7 +1152,7 @@
           <a:p>
             <a:fld id="{15E020E6-F8D9-4825-A9D6-C37AF1154F69}" type="datetime1">
               <a:rPr lang="en-US" smtClean="0"/>
-              <a:t>5/31/2020</a:t>
+              <a:t>6/7/2020</a:t>
             </a:fld>
             <a:endParaRPr lang="en-US"/>
           </a:p>
@@ -1405,7 +1405,7 @@
           <a:p>
             <a:fld id="{8076DA9F-4F33-47E2-BCB6-74E79BC19394}" type="datetime1">
               <a:rPr lang="en-US" smtClean="0"/>
-              <a:t>5/31/2020</a:t>
+              <a:t>6/7/2020</a:t>
             </a:fld>
             <a:endParaRPr lang="en-US"/>
           </a:p>
@@ -1646,7 +1646,7 @@
           <a:p>
             <a:fld id="{FBAF2370-96AE-4D11-A0C2-121376BBDA55}" type="datetime1">
               <a:rPr lang="en-US" smtClean="0"/>
-              <a:t>5/31/2020</a:t>
+              <a:t>6/7/2020</a:t>
             </a:fld>
             <a:endParaRPr lang="en-US"/>
           </a:p>
@@ -2022,7 +2022,7 @@
           <a:p>
             <a:fld id="{169582F2-1EA8-421C-B8F8-D8CA1E3EFF62}" type="datetime1">
               <a:rPr lang="en-US" smtClean="0"/>
-              <a:t>5/31/2020</a:t>
+              <a:t>6/7/2020</a:t>
             </a:fld>
             <a:endParaRPr lang="en-US"/>
           </a:p>
@@ -2149,7 +2149,7 @@
           <a:p>
             <a:fld id="{A517D7DA-5058-420F-9DBC-85DE61D477C2}" type="datetime1">
               <a:rPr lang="en-US" smtClean="0"/>
-              <a:t>5/31/2020</a:t>
+              <a:t>6/7/2020</a:t>
             </a:fld>
             <a:endParaRPr lang="en-US"/>
           </a:p>
@@ -2253,7 +2253,7 @@
           <a:p>
             <a:fld id="{8FFB225B-7C69-40F3-B61C-519BFAC1134E}" type="datetime1">
               <a:rPr lang="en-US" smtClean="0"/>
-              <a:t>5/31/2020</a:t>
+              <a:t>6/7/2020</a:t>
             </a:fld>
             <a:endParaRPr lang="en-US"/>
           </a:p>
@@ -2539,7 +2539,7 @@
           <a:p>
             <a:fld id="{ECAE7071-FDDA-440A-98D6-E8E6F92A50F1}" type="datetime1">
               <a:rPr lang="en-US" smtClean="0"/>
-              <a:t>5/31/2020</a:t>
+              <a:t>6/7/2020</a:t>
             </a:fld>
             <a:endParaRPr lang="en-US"/>
           </a:p>
@@ -2805,7 +2805,7 @@
           <a:p>
             <a:fld id="{AC5FFC63-6CD2-42EF-9476-C30364AABDD9}" type="datetime1">
               <a:rPr lang="en-US" smtClean="0"/>
-              <a:t>5/31/2020</a:t>
+              <a:t>6/7/2020</a:t>
             </a:fld>
             <a:endParaRPr lang="en-US"/>
           </a:p>
@@ -3027,7 +3027,7 @@
           <a:p>
             <a:fld id="{19B6766A-8FD1-4A76-8D41-2F10BEB35D78}" type="datetime1">
               <a:rPr lang="en-US" smtClean="0"/>
-              <a:t>5/31/2020</a:t>
+              <a:t>6/7/2020</a:t>
             </a:fld>
             <a:endParaRPr lang="en-US"/>
           </a:p>
@@ -4937,8 +4937,8 @@
           </a:p>
         </p:txBody>
       </p:sp>
-      <mc:AlternateContent xmlns:mc="http://schemas.openxmlformats.org/markup-compatibility/2006">
-        <mc:Choice xmlns:a14="http://schemas.microsoft.com/office/drawing/2010/main" Requires="a14">
+      <mc:AlternateContent xmlns:mc="http://schemas.openxmlformats.org/markup-compatibility/2006" xmlns:a14="http://schemas.microsoft.com/office/drawing/2010/main">
+        <mc:Choice Requires="a14">
           <p:sp>
             <p:nvSpPr>
               <p:cNvPr id="3" name="TextBox 2">
@@ -5081,7 +5081,7 @@
             </p:txBody>
           </p:sp>
         </mc:Choice>
-        <mc:Fallback>
+        <mc:Fallback xmlns="">
           <p:sp>
             <p:nvSpPr>
               <p:cNvPr id="3" name="TextBox 2">
@@ -6885,6 +6885,839 @@
           <a:chExt cx="0" cy="0"/>
         </a:xfrm>
       </p:grpSpPr>
+      <p:pic>
+        <p:nvPicPr>
+          <p:cNvPr id="5" name="Picture 4">
+            <a:extLst>
+              <a:ext uri="{FF2B5EF4-FFF2-40B4-BE49-F238E27FC236}">
+                <a16:creationId xmlns:a16="http://schemas.microsoft.com/office/drawing/2014/main" id="{A46ECFDE-0364-4174-96FC-04347BB101E3}"/>
+              </a:ext>
+            </a:extLst>
+          </p:cNvPr>
+          <p:cNvPicPr>
+            <a:picLocks noChangeAspect="1"/>
+          </p:cNvPicPr>
+          <p:nvPr/>
+        </p:nvPicPr>
+        <p:blipFill>
+          <a:blip r:embed="rId2"/>
+          <a:stretch>
+            <a:fillRect/>
+          </a:stretch>
+        </p:blipFill>
+        <p:spPr>
+          <a:xfrm>
+            <a:off x="4267844" y="1646582"/>
+            <a:ext cx="3130320" cy="1920878"/>
+          </a:xfrm>
+          <a:prstGeom prst="rect">
+            <a:avLst/>
+          </a:prstGeom>
+        </p:spPr>
+      </p:pic>
+      <p:cxnSp>
+        <p:nvCxnSpPr>
+          <p:cNvPr id="7" name="Straight Connector 6">
+            <a:extLst>
+              <a:ext uri="{FF2B5EF4-FFF2-40B4-BE49-F238E27FC236}">
+                <a16:creationId xmlns:a16="http://schemas.microsoft.com/office/drawing/2014/main" id="{A36CEFC8-D716-4724-91F5-D5C322689B3F}"/>
+              </a:ext>
+            </a:extLst>
+          </p:cNvPr>
+          <p:cNvCxnSpPr>
+            <a:cxnSpLocks/>
+          </p:cNvCxnSpPr>
+          <p:nvPr/>
+        </p:nvCxnSpPr>
+        <p:spPr>
+          <a:xfrm>
+            <a:off x="5236707" y="2883694"/>
+            <a:ext cx="0" cy="495299"/>
+          </a:xfrm>
+          <a:prstGeom prst="line">
+            <a:avLst/>
+          </a:prstGeom>
+          <a:ln w="12700">
+            <a:solidFill>
+              <a:schemeClr val="tx1"/>
+            </a:solidFill>
+            <a:prstDash val="solid"/>
+          </a:ln>
+        </p:spPr>
+        <p:style>
+          <a:lnRef idx="1">
+            <a:schemeClr val="accent1"/>
+          </a:lnRef>
+          <a:fillRef idx="0">
+            <a:schemeClr val="accent1"/>
+          </a:fillRef>
+          <a:effectRef idx="0">
+            <a:schemeClr val="accent1"/>
+          </a:effectRef>
+          <a:fontRef idx="minor">
+            <a:schemeClr val="tx1"/>
+          </a:fontRef>
+        </p:style>
+      </p:cxnSp>
+      <p:cxnSp>
+        <p:nvCxnSpPr>
+          <p:cNvPr id="13" name="Straight Connector 12">
+            <a:extLst>
+              <a:ext uri="{FF2B5EF4-FFF2-40B4-BE49-F238E27FC236}">
+                <a16:creationId xmlns:a16="http://schemas.microsoft.com/office/drawing/2014/main" id="{AB847FE3-5855-4FEF-86DA-7DFF52E9481B}"/>
+              </a:ext>
+            </a:extLst>
+          </p:cNvPr>
+          <p:cNvCxnSpPr>
+            <a:cxnSpLocks/>
+          </p:cNvCxnSpPr>
+          <p:nvPr/>
+        </p:nvCxnSpPr>
+        <p:spPr>
+          <a:xfrm>
+            <a:off x="6852783" y="2028825"/>
+            <a:ext cx="0" cy="1350168"/>
+          </a:xfrm>
+          <a:prstGeom prst="line">
+            <a:avLst/>
+          </a:prstGeom>
+          <a:ln w="12700">
+            <a:solidFill>
+              <a:schemeClr val="tx1"/>
+            </a:solidFill>
+            <a:prstDash val="solid"/>
+          </a:ln>
+        </p:spPr>
+        <p:style>
+          <a:lnRef idx="1">
+            <a:schemeClr val="accent1"/>
+          </a:lnRef>
+          <a:fillRef idx="0">
+            <a:schemeClr val="accent1"/>
+          </a:fillRef>
+          <a:effectRef idx="0">
+            <a:schemeClr val="accent1"/>
+          </a:effectRef>
+          <a:fontRef idx="minor">
+            <a:schemeClr val="tx1"/>
+          </a:fontRef>
+        </p:style>
+      </p:cxnSp>
+      <p:cxnSp>
+        <p:nvCxnSpPr>
+          <p:cNvPr id="16" name="Straight Connector 15">
+            <a:extLst>
+              <a:ext uri="{FF2B5EF4-FFF2-40B4-BE49-F238E27FC236}">
+                <a16:creationId xmlns:a16="http://schemas.microsoft.com/office/drawing/2014/main" id="{1949B656-A905-4EB2-B102-C55B6AD52ABD}"/>
+              </a:ext>
+            </a:extLst>
+          </p:cNvPr>
+          <p:cNvCxnSpPr>
+            <a:cxnSpLocks/>
+          </p:cNvCxnSpPr>
+          <p:nvPr/>
+        </p:nvCxnSpPr>
+        <p:spPr>
+          <a:xfrm flipV="1">
+            <a:off x="5236707" y="2883694"/>
+            <a:ext cx="1616075" cy="1"/>
+          </a:xfrm>
+          <a:prstGeom prst="line">
+            <a:avLst/>
+          </a:prstGeom>
+          <a:ln w="28575">
+            <a:solidFill>
+              <a:srgbClr val="00B050"/>
+            </a:solidFill>
+            <a:prstDash val="sysDot"/>
+          </a:ln>
+        </p:spPr>
+        <p:style>
+          <a:lnRef idx="1">
+            <a:schemeClr val="accent1"/>
+          </a:lnRef>
+          <a:fillRef idx="0">
+            <a:schemeClr val="accent1"/>
+          </a:fillRef>
+          <a:effectRef idx="0">
+            <a:schemeClr val="accent1"/>
+          </a:effectRef>
+          <a:fontRef idx="minor">
+            <a:schemeClr val="tx1"/>
+          </a:fontRef>
+        </p:style>
+      </p:cxnSp>
+      <p:sp>
+        <p:nvSpPr>
+          <p:cNvPr id="6" name="Arrow: Curved Left 5">
+            <a:extLst>
+              <a:ext uri="{FF2B5EF4-FFF2-40B4-BE49-F238E27FC236}">
+                <a16:creationId xmlns:a16="http://schemas.microsoft.com/office/drawing/2014/main" id="{9E9E81E4-15E3-4B98-AB24-A662A2336D41}"/>
+              </a:ext>
+            </a:extLst>
+          </p:cNvPr>
+          <p:cNvSpPr/>
+          <p:nvPr/>
+        </p:nvSpPr>
+        <p:spPr>
+          <a:xfrm>
+            <a:off x="6852782" y="2028825"/>
+            <a:ext cx="269860" cy="913478"/>
+          </a:xfrm>
+          <a:prstGeom prst="curvedLeftArrow">
+            <a:avLst/>
+          </a:prstGeom>
+        </p:spPr>
+        <p:style>
+          <a:lnRef idx="2">
+            <a:schemeClr val="accent1">
+              <a:shade val="50000"/>
+            </a:schemeClr>
+          </a:lnRef>
+          <a:fillRef idx="1">
+            <a:schemeClr val="accent1"/>
+          </a:fillRef>
+          <a:effectRef idx="0">
+            <a:schemeClr val="accent1"/>
+          </a:effectRef>
+          <a:fontRef idx="minor">
+            <a:schemeClr val="lt1"/>
+          </a:fontRef>
+        </p:style>
+        <p:txBody>
+          <a:bodyPr rtlCol="0" anchor="ctr"/>
+          <a:lstStyle/>
+          <a:p>
+            <a:pPr algn="ctr"/>
+            <a:endParaRPr lang="en-US">
+              <a:solidFill>
+                <a:schemeClr val="tx1"/>
+              </a:solidFill>
+            </a:endParaRPr>
+          </a:p>
+        </p:txBody>
+      </p:sp>
+      <mc:AlternateContent xmlns:mc="http://schemas.openxmlformats.org/markup-compatibility/2006">
+        <mc:Choice xmlns:a14="http://schemas.microsoft.com/office/drawing/2010/main" Requires="a14">
+          <p:sp>
+            <p:nvSpPr>
+              <p:cNvPr id="9" name="TextBox 8">
+                <a:extLst>
+                  <a:ext uri="{FF2B5EF4-FFF2-40B4-BE49-F238E27FC236}">
+                    <a16:creationId xmlns:a16="http://schemas.microsoft.com/office/drawing/2014/main" id="{A3F6D461-9EFA-424F-9E48-8E3F99E72932}"/>
+                  </a:ext>
+                </a:extLst>
+              </p:cNvPr>
+              <p:cNvSpPr txBox="1"/>
+              <p:nvPr/>
+            </p:nvSpPr>
+            <p:spPr>
+              <a:xfrm>
+                <a:off x="4751286" y="2411632"/>
+                <a:ext cx="508280" cy="276999"/>
+              </a:xfrm>
+              <a:prstGeom prst="rect">
+                <a:avLst/>
+              </a:prstGeom>
+              <a:noFill/>
+            </p:spPr>
+            <p:txBody>
+              <a:bodyPr wrap="none" lIns="0" tIns="0" rIns="0" bIns="0" rtlCol="0">
+                <a:spAutoFit/>
+              </a:bodyPr>
+              <a:lstStyle/>
+              <a:p>
+                <a14:m>
+                  <m:oMathPara xmlns:m="http://schemas.openxmlformats.org/officeDocument/2006/math">
+                    <m:oMathParaPr>
+                      <m:jc m:val="centerGroup"/>
+                    </m:oMathParaPr>
+                    <m:oMath xmlns:m="http://schemas.openxmlformats.org/officeDocument/2006/math">
+                      <m:r>
+                        <a:rPr lang="en-US" b="0" i="1" smtClean="0">
+                          <a:latin typeface="Cambria Math" panose="02040503050406030204" pitchFamily="18" charset="0"/>
+                        </a:rPr>
+                        <m:t>𝑓</m:t>
+                      </m:r>
+                      <m:d>
+                        <m:dPr>
+                          <m:ctrlPr>
+                            <a:rPr lang="en-US" i="1" smtClean="0">
+                              <a:latin typeface="Cambria Math" panose="02040503050406030204" pitchFamily="18" charset="0"/>
+                            </a:rPr>
+                          </m:ctrlPr>
+                        </m:dPr>
+                        <m:e>
+                          <m:r>
+                            <a:rPr lang="en-US" b="0" i="1" smtClean="0">
+                              <a:latin typeface="Cambria Math" panose="02040503050406030204" pitchFamily="18" charset="0"/>
+                            </a:rPr>
+                            <m:t>𝑥</m:t>
+                          </m:r>
+                        </m:e>
+                      </m:d>
+                    </m:oMath>
+                  </m:oMathPara>
+                </a14:m>
+                <a:endParaRPr lang="en-US" dirty="0"/>
+              </a:p>
+            </p:txBody>
+          </p:sp>
+        </mc:Choice>
+        <mc:Fallback>
+          <p:sp>
+            <p:nvSpPr>
+              <p:cNvPr id="9" name="TextBox 8">
+                <a:extLst>
+                  <a:ext uri="{FF2B5EF4-FFF2-40B4-BE49-F238E27FC236}">
+                    <a16:creationId xmlns:a16="http://schemas.microsoft.com/office/drawing/2014/main" id="{A3F6D461-9EFA-424F-9E48-8E3F99E72932}"/>
+                  </a:ext>
+                </a:extLst>
+              </p:cNvPr>
+              <p:cNvSpPr txBox="1">
+                <a:spLocks noRot="1" noChangeAspect="1" noMove="1" noResize="1" noEditPoints="1" noAdjustHandles="1" noChangeArrowheads="1" noChangeShapeType="1" noTextEdit="1"/>
+              </p:cNvSpPr>
+              <p:nvPr/>
+            </p:nvSpPr>
+            <p:spPr>
+              <a:xfrm>
+                <a:off x="4751286" y="2411632"/>
+                <a:ext cx="508280" cy="276999"/>
+              </a:xfrm>
+              <a:prstGeom prst="rect">
+                <a:avLst/>
+              </a:prstGeom>
+              <a:blipFill>
+                <a:blip r:embed="rId3"/>
+                <a:stretch>
+                  <a:fillRect l="-15476" t="-4444" b="-35556"/>
+                </a:stretch>
+              </a:blipFill>
+            </p:spPr>
+            <p:txBody>
+              <a:bodyPr/>
+              <a:lstStyle/>
+              <a:p>
+                <a:r>
+                  <a:rPr lang="en-US">
+                    <a:noFill/>
+                  </a:rPr>
+                  <a:t> </a:t>
+                </a:r>
+              </a:p>
+            </p:txBody>
+          </p:sp>
+        </mc:Fallback>
+      </mc:AlternateContent>
+      <p:sp>
+        <p:nvSpPr>
+          <p:cNvPr id="10" name="Oval 9">
+            <a:extLst>
+              <a:ext uri="{FF2B5EF4-FFF2-40B4-BE49-F238E27FC236}">
+                <a16:creationId xmlns:a16="http://schemas.microsoft.com/office/drawing/2014/main" id="{1C0FEB90-55BF-4B16-8C76-19F156F6333B}"/>
+              </a:ext>
+            </a:extLst>
+          </p:cNvPr>
+          <p:cNvSpPr/>
+          <p:nvPr/>
+        </p:nvSpPr>
+        <p:spPr>
+          <a:xfrm>
+            <a:off x="5187709" y="2836494"/>
+            <a:ext cx="91440" cy="91440"/>
+          </a:xfrm>
+          <a:prstGeom prst="ellipse">
+            <a:avLst/>
+          </a:prstGeom>
+          <a:solidFill>
+            <a:srgbClr val="FF0000"/>
+          </a:solidFill>
+          <a:ln>
+            <a:solidFill>
+              <a:srgbClr val="FF0000"/>
+            </a:solidFill>
+          </a:ln>
+        </p:spPr>
+        <p:style>
+          <a:lnRef idx="2">
+            <a:schemeClr val="accent1">
+              <a:shade val="50000"/>
+            </a:schemeClr>
+          </a:lnRef>
+          <a:fillRef idx="1">
+            <a:schemeClr val="accent1"/>
+          </a:fillRef>
+          <a:effectRef idx="0">
+            <a:schemeClr val="accent1"/>
+          </a:effectRef>
+          <a:fontRef idx="minor">
+            <a:schemeClr val="lt1"/>
+          </a:fontRef>
+        </p:style>
+        <p:txBody>
+          <a:bodyPr rtlCol="0" anchor="ctr"/>
+          <a:lstStyle/>
+          <a:p>
+            <a:pPr algn="ctr"/>
+            <a:endParaRPr lang="en-US"/>
+          </a:p>
+        </p:txBody>
+      </p:sp>
+      <p:sp>
+        <p:nvSpPr>
+          <p:cNvPr id="24" name="Oval 23">
+            <a:extLst>
+              <a:ext uri="{FF2B5EF4-FFF2-40B4-BE49-F238E27FC236}">
+                <a16:creationId xmlns:a16="http://schemas.microsoft.com/office/drawing/2014/main" id="{02677FB4-2E70-4783-92FA-FED9A289769E}"/>
+              </a:ext>
+            </a:extLst>
+          </p:cNvPr>
+          <p:cNvSpPr/>
+          <p:nvPr/>
+        </p:nvSpPr>
+        <p:spPr>
+          <a:xfrm>
+            <a:off x="6804871" y="1980045"/>
+            <a:ext cx="91440" cy="91440"/>
+          </a:xfrm>
+          <a:prstGeom prst="ellipse">
+            <a:avLst/>
+          </a:prstGeom>
+          <a:solidFill>
+            <a:srgbClr val="FF0000"/>
+          </a:solidFill>
+          <a:ln>
+            <a:solidFill>
+              <a:srgbClr val="FF0000"/>
+            </a:solidFill>
+          </a:ln>
+        </p:spPr>
+        <p:style>
+          <a:lnRef idx="2">
+            <a:schemeClr val="accent1">
+              <a:shade val="50000"/>
+            </a:schemeClr>
+          </a:lnRef>
+          <a:fillRef idx="1">
+            <a:schemeClr val="accent1"/>
+          </a:fillRef>
+          <a:effectRef idx="0">
+            <a:schemeClr val="accent1"/>
+          </a:effectRef>
+          <a:fontRef idx="minor">
+            <a:schemeClr val="lt1"/>
+          </a:fontRef>
+        </p:style>
+        <p:txBody>
+          <a:bodyPr rtlCol="0" anchor="ctr"/>
+          <a:lstStyle/>
+          <a:p>
+            <a:pPr algn="ctr"/>
+            <a:endParaRPr lang="en-US"/>
+          </a:p>
+        </p:txBody>
+      </p:sp>
+      <mc:AlternateContent xmlns:mc="http://schemas.openxmlformats.org/markup-compatibility/2006">
+        <mc:Choice xmlns:a14="http://schemas.microsoft.com/office/drawing/2010/main" Requires="a14">
+          <p:sp>
+            <p:nvSpPr>
+              <p:cNvPr id="25" name="TextBox 24">
+                <a:extLst>
+                  <a:ext uri="{FF2B5EF4-FFF2-40B4-BE49-F238E27FC236}">
+                    <a16:creationId xmlns:a16="http://schemas.microsoft.com/office/drawing/2014/main" id="{094563E8-18BE-4CEC-9EC6-F25B7AC1B6F3}"/>
+                  </a:ext>
+                </a:extLst>
+              </p:cNvPr>
+              <p:cNvSpPr txBox="1"/>
+              <p:nvPr/>
+            </p:nvSpPr>
+            <p:spPr>
+              <a:xfrm>
+                <a:off x="5777645" y="1569227"/>
+                <a:ext cx="1052276" cy="276999"/>
+              </a:xfrm>
+              <a:prstGeom prst="rect">
+                <a:avLst/>
+              </a:prstGeom>
+              <a:noFill/>
+            </p:spPr>
+            <p:txBody>
+              <a:bodyPr wrap="none" lIns="0" tIns="0" rIns="0" bIns="0" rtlCol="0">
+                <a:spAutoFit/>
+              </a:bodyPr>
+              <a:lstStyle/>
+              <a:p>
+                <a14:m>
+                  <m:oMathPara xmlns:m="http://schemas.openxmlformats.org/officeDocument/2006/math">
+                    <m:oMathParaPr>
+                      <m:jc m:val="centerGroup"/>
+                    </m:oMathParaPr>
+                    <m:oMath xmlns:m="http://schemas.openxmlformats.org/officeDocument/2006/math">
+                      <m:r>
+                        <a:rPr lang="en-US" b="0" i="1" smtClean="0">
+                          <a:latin typeface="Cambria Math" panose="02040503050406030204" pitchFamily="18" charset="0"/>
+                        </a:rPr>
+                        <m:t>𝑓</m:t>
+                      </m:r>
+                      <m:d>
+                        <m:dPr>
+                          <m:ctrlPr>
+                            <a:rPr lang="en-US" i="1" smtClean="0">
+                              <a:latin typeface="Cambria Math" panose="02040503050406030204" pitchFamily="18" charset="0"/>
+                            </a:rPr>
+                          </m:ctrlPr>
+                        </m:dPr>
+                        <m:e>
+                          <m:r>
+                            <a:rPr lang="en-US" b="0" i="1" smtClean="0">
+                              <a:latin typeface="Cambria Math" panose="02040503050406030204" pitchFamily="18" charset="0"/>
+                            </a:rPr>
+                            <m:t>𝑥</m:t>
+                          </m:r>
+                          <m:r>
+                            <a:rPr lang="en-US" b="0" i="1" smtClean="0">
+                              <a:latin typeface="Cambria Math" panose="02040503050406030204" pitchFamily="18" charset="0"/>
+                            </a:rPr>
+                            <m:t>+</m:t>
+                          </m:r>
+                          <m:r>
+                            <m:rPr>
+                              <m:sty m:val="p"/>
+                            </m:rPr>
+                            <a:rPr lang="el-GR" b="0" i="1" smtClean="0">
+                              <a:latin typeface="Cambria Math" panose="02040503050406030204" pitchFamily="18" charset="0"/>
+                              <a:ea typeface="Cambria Math" panose="02040503050406030204" pitchFamily="18" charset="0"/>
+                            </a:rPr>
+                            <m:t>Δ</m:t>
+                          </m:r>
+                          <m:r>
+                            <a:rPr lang="en-US" b="0" i="1" smtClean="0">
+                              <a:latin typeface="Cambria Math" panose="02040503050406030204" pitchFamily="18" charset="0"/>
+                              <a:ea typeface="Cambria Math" panose="02040503050406030204" pitchFamily="18" charset="0"/>
+                            </a:rPr>
+                            <m:t>𝑥</m:t>
+                          </m:r>
+                        </m:e>
+                      </m:d>
+                    </m:oMath>
+                  </m:oMathPara>
+                </a14:m>
+                <a:endParaRPr lang="en-US" dirty="0"/>
+              </a:p>
+            </p:txBody>
+          </p:sp>
+        </mc:Choice>
+        <mc:Fallback>
+          <p:sp>
+            <p:nvSpPr>
+              <p:cNvPr id="25" name="TextBox 24">
+                <a:extLst>
+                  <a:ext uri="{FF2B5EF4-FFF2-40B4-BE49-F238E27FC236}">
+                    <a16:creationId xmlns:a16="http://schemas.microsoft.com/office/drawing/2014/main" id="{094563E8-18BE-4CEC-9EC6-F25B7AC1B6F3}"/>
+                  </a:ext>
+                </a:extLst>
+              </p:cNvPr>
+              <p:cNvSpPr txBox="1">
+                <a:spLocks noRot="1" noChangeAspect="1" noMove="1" noResize="1" noEditPoints="1" noAdjustHandles="1" noChangeArrowheads="1" noChangeShapeType="1" noTextEdit="1"/>
+              </p:cNvSpPr>
+              <p:nvPr/>
+            </p:nvSpPr>
+            <p:spPr>
+              <a:xfrm>
+                <a:off x="5777645" y="1569227"/>
+                <a:ext cx="1052276" cy="276999"/>
+              </a:xfrm>
+              <a:prstGeom prst="rect">
+                <a:avLst/>
+              </a:prstGeom>
+              <a:blipFill>
+                <a:blip r:embed="rId4"/>
+                <a:stretch>
+                  <a:fillRect l="-7558" t="-2174" b="-32609"/>
+                </a:stretch>
+              </a:blipFill>
+            </p:spPr>
+            <p:txBody>
+              <a:bodyPr/>
+              <a:lstStyle/>
+              <a:p>
+                <a:r>
+                  <a:rPr lang="en-US">
+                    <a:noFill/>
+                  </a:rPr>
+                  <a:t> </a:t>
+                </a:r>
+              </a:p>
+            </p:txBody>
+          </p:sp>
+        </mc:Fallback>
+      </mc:AlternateContent>
+      <p:cxnSp>
+        <p:nvCxnSpPr>
+          <p:cNvPr id="12" name="Straight Arrow Connector 11">
+            <a:extLst>
+              <a:ext uri="{FF2B5EF4-FFF2-40B4-BE49-F238E27FC236}">
+                <a16:creationId xmlns:a16="http://schemas.microsoft.com/office/drawing/2014/main" id="{3FA0B86F-6F47-49C0-B52D-D1EAFADDFE39}"/>
+              </a:ext>
+            </a:extLst>
+          </p:cNvPr>
+          <p:cNvCxnSpPr>
+            <a:cxnSpLocks/>
+            <a:stCxn id="9" idx="2"/>
+            <a:endCxn id="10" idx="1"/>
+          </p:cNvCxnSpPr>
+          <p:nvPr/>
+        </p:nvCxnSpPr>
+        <p:spPr>
+          <a:xfrm>
+            <a:off x="5005426" y="2688631"/>
+            <a:ext cx="195674" cy="161254"/>
+          </a:xfrm>
+          <a:prstGeom prst="straightConnector1">
+            <a:avLst/>
+          </a:prstGeom>
+          <a:ln>
+            <a:solidFill>
+              <a:srgbClr val="FF0000"/>
+            </a:solidFill>
+            <a:tailEnd type="triangle"/>
+          </a:ln>
+        </p:spPr>
+        <p:style>
+          <a:lnRef idx="1">
+            <a:schemeClr val="accent1"/>
+          </a:lnRef>
+          <a:fillRef idx="0">
+            <a:schemeClr val="accent1"/>
+          </a:fillRef>
+          <a:effectRef idx="0">
+            <a:schemeClr val="accent1"/>
+          </a:effectRef>
+          <a:fontRef idx="minor">
+            <a:schemeClr val="tx1"/>
+          </a:fontRef>
+        </p:style>
+      </p:cxnSp>
+      <p:cxnSp>
+        <p:nvCxnSpPr>
+          <p:cNvPr id="27" name="Straight Arrow Connector 26">
+            <a:extLst>
+              <a:ext uri="{FF2B5EF4-FFF2-40B4-BE49-F238E27FC236}">
+                <a16:creationId xmlns:a16="http://schemas.microsoft.com/office/drawing/2014/main" id="{526998A1-1333-44B8-85C3-A36FFD4E58B4}"/>
+              </a:ext>
+            </a:extLst>
+          </p:cNvPr>
+          <p:cNvCxnSpPr>
+            <a:cxnSpLocks/>
+            <a:endCxn id="24" idx="1"/>
+          </p:cNvCxnSpPr>
+          <p:nvPr/>
+        </p:nvCxnSpPr>
+        <p:spPr>
+          <a:xfrm>
+            <a:off x="6328607" y="1839362"/>
+            <a:ext cx="489655" cy="154074"/>
+          </a:xfrm>
+          <a:prstGeom prst="straightConnector1">
+            <a:avLst/>
+          </a:prstGeom>
+          <a:ln>
+            <a:solidFill>
+              <a:srgbClr val="FF0000"/>
+            </a:solidFill>
+            <a:tailEnd type="triangle"/>
+          </a:ln>
+        </p:spPr>
+        <p:style>
+          <a:lnRef idx="1">
+            <a:schemeClr val="accent1"/>
+          </a:lnRef>
+          <a:fillRef idx="0">
+            <a:schemeClr val="accent1"/>
+          </a:fillRef>
+          <a:effectRef idx="0">
+            <a:schemeClr val="accent1"/>
+          </a:effectRef>
+          <a:fontRef idx="minor">
+            <a:schemeClr val="tx1"/>
+          </a:fontRef>
+        </p:style>
+      </p:cxnSp>
+      <p:cxnSp>
+        <p:nvCxnSpPr>
+          <p:cNvPr id="34" name="Straight Connector 33">
+            <a:extLst>
+              <a:ext uri="{FF2B5EF4-FFF2-40B4-BE49-F238E27FC236}">
+                <a16:creationId xmlns:a16="http://schemas.microsoft.com/office/drawing/2014/main" id="{0C04E1CB-DB9E-486E-81B0-B4A207145148}"/>
+              </a:ext>
+            </a:extLst>
+          </p:cNvPr>
+          <p:cNvCxnSpPr>
+            <a:cxnSpLocks/>
+            <a:stCxn id="24" idx="4"/>
+          </p:cNvCxnSpPr>
+          <p:nvPr/>
+        </p:nvCxnSpPr>
+        <p:spPr>
+          <a:xfrm>
+            <a:off x="6850591" y="2071485"/>
+            <a:ext cx="0" cy="812209"/>
+          </a:xfrm>
+          <a:prstGeom prst="line">
+            <a:avLst/>
+          </a:prstGeom>
+          <a:ln w="28575">
+            <a:solidFill>
+              <a:srgbClr val="FF0000"/>
+            </a:solidFill>
+            <a:prstDash val="sysDot"/>
+          </a:ln>
+        </p:spPr>
+        <p:style>
+          <a:lnRef idx="1">
+            <a:schemeClr val="accent1"/>
+          </a:lnRef>
+          <a:fillRef idx="0">
+            <a:schemeClr val="accent1"/>
+          </a:fillRef>
+          <a:effectRef idx="0">
+            <a:schemeClr val="accent1"/>
+          </a:effectRef>
+          <a:fontRef idx="minor">
+            <a:schemeClr val="tx1"/>
+          </a:fontRef>
+        </p:style>
+      </p:cxnSp>
+      <mc:AlternateContent xmlns:mc="http://schemas.openxmlformats.org/markup-compatibility/2006">
+        <mc:Choice xmlns:a14="http://schemas.microsoft.com/office/drawing/2010/main" Requires="a14">
+          <p:sp>
+            <p:nvSpPr>
+              <p:cNvPr id="28" name="Rectangle 27">
+                <a:extLst>
+                  <a:ext uri="{FF2B5EF4-FFF2-40B4-BE49-F238E27FC236}">
+                    <a16:creationId xmlns:a16="http://schemas.microsoft.com/office/drawing/2014/main" id="{301C2460-C68D-4573-984F-FEEA398752F8}"/>
+                  </a:ext>
+                </a:extLst>
+              </p:cNvPr>
+              <p:cNvSpPr/>
+              <p:nvPr/>
+            </p:nvSpPr>
+            <p:spPr>
+              <a:xfrm>
+                <a:off x="5938682" y="2584592"/>
+                <a:ext cx="505844" cy="369332"/>
+              </a:xfrm>
+              <a:prstGeom prst="rect">
+                <a:avLst/>
+              </a:prstGeom>
+            </p:spPr>
+            <p:txBody>
+              <a:bodyPr wrap="none">
+                <a:spAutoFit/>
+              </a:bodyPr>
+              <a:lstStyle/>
+              <a:p>
+                <a14:m>
+                  <m:oMathPara xmlns:m="http://schemas.openxmlformats.org/officeDocument/2006/math">
+                    <m:oMathParaPr>
+                      <m:jc m:val="centerGroup"/>
+                    </m:oMathParaPr>
+                    <m:oMath xmlns:m="http://schemas.openxmlformats.org/officeDocument/2006/math">
+                      <m:r>
+                        <m:rPr>
+                          <m:sty m:val="p"/>
+                        </m:rPr>
+                        <a:rPr lang="el-GR" i="1" smtClean="0">
+                          <a:ln>
+                            <a:solidFill>
+                              <a:srgbClr val="00B050"/>
+                            </a:solidFill>
+                          </a:ln>
+                          <a:solidFill>
+                            <a:srgbClr val="00B050"/>
+                          </a:solidFill>
+                          <a:latin typeface="Cambria Math" panose="02040503050406030204" pitchFamily="18" charset="0"/>
+                          <a:ea typeface="Cambria Math" panose="02040503050406030204" pitchFamily="18" charset="0"/>
+                        </a:rPr>
+                        <m:t>Δ</m:t>
+                      </m:r>
+                      <m:r>
+                        <a:rPr lang="en-US" b="0" i="1" smtClean="0">
+                          <a:ln>
+                            <a:solidFill>
+                              <a:srgbClr val="00B050"/>
+                            </a:solidFill>
+                          </a:ln>
+                          <a:solidFill>
+                            <a:srgbClr val="00B050"/>
+                          </a:solidFill>
+                          <a:latin typeface="Cambria Math" panose="02040503050406030204" pitchFamily="18" charset="0"/>
+                          <a:ea typeface="Cambria Math" panose="02040503050406030204" pitchFamily="18" charset="0"/>
+                        </a:rPr>
+                        <m:t>𝑥</m:t>
+                      </m:r>
+                    </m:oMath>
+                  </m:oMathPara>
+                </a14:m>
+                <a:endParaRPr lang="en-US" dirty="0">
+                  <a:ln>
+                    <a:solidFill>
+                      <a:srgbClr val="00B050"/>
+                    </a:solidFill>
+                  </a:ln>
+                  <a:solidFill>
+                    <a:srgbClr val="00B050"/>
+                  </a:solidFill>
+                </a:endParaRPr>
+              </a:p>
+            </p:txBody>
+          </p:sp>
+        </mc:Choice>
+        <mc:Fallback>
+          <p:sp>
+            <p:nvSpPr>
+              <p:cNvPr id="28" name="Rectangle 27">
+                <a:extLst>
+                  <a:ext uri="{FF2B5EF4-FFF2-40B4-BE49-F238E27FC236}">
+                    <a16:creationId xmlns:a16="http://schemas.microsoft.com/office/drawing/2014/main" id="{301C2460-C68D-4573-984F-FEEA398752F8}"/>
+                  </a:ext>
+                </a:extLst>
+              </p:cNvPr>
+              <p:cNvSpPr>
+                <a:spLocks noRot="1" noChangeAspect="1" noMove="1" noResize="1" noEditPoints="1" noAdjustHandles="1" noChangeArrowheads="1" noChangeShapeType="1" noTextEdit="1"/>
+              </p:cNvSpPr>
+              <p:nvPr/>
+            </p:nvSpPr>
+            <p:spPr>
+              <a:xfrm>
+                <a:off x="5938682" y="2584592"/>
+                <a:ext cx="505844" cy="369332"/>
+              </a:xfrm>
+              <a:prstGeom prst="rect">
+                <a:avLst/>
+              </a:prstGeom>
+              <a:blipFill>
+                <a:blip r:embed="rId5"/>
+                <a:stretch>
+                  <a:fillRect/>
+                </a:stretch>
+              </a:blipFill>
+            </p:spPr>
+            <p:txBody>
+              <a:bodyPr/>
+              <a:lstStyle/>
+              <a:p>
+                <a:r>
+                  <a:rPr lang="en-US">
+                    <a:noFill/>
+                  </a:rPr>
+                  <a:t> </a:t>
+                </a:r>
+              </a:p>
+            </p:txBody>
+          </p:sp>
+        </mc:Fallback>
+      </mc:AlternateContent>
       <p:sp>
         <p:nvSpPr>
           <p:cNvPr id="22" name="TextBox 21">
@@ -7013,7 +7846,7 @@
                   <a:srgbClr val="7030A0"/>
                 </a:solidFill>
               </a:rPr>
-              <a:t>20 pts</a:t>
+              <a:t>15 pts</a:t>
             </a:r>
           </a:p>
         </p:txBody>
@@ -7063,8 +7896,8 @@
             </p:nvSpPr>
             <p:spPr>
               <a:xfrm>
-                <a:off x="919753" y="2607021"/>
-                <a:ext cx="2759345" cy="622799"/>
+                <a:off x="808065" y="2607021"/>
+                <a:ext cx="2742610" cy="622799"/>
               </a:xfrm>
               <a:prstGeom prst="rect">
                 <a:avLst/>
@@ -7088,7 +7921,7 @@
                         <a:rPr lang="en-US" b="0" i="1" smtClean="0">
                           <a:latin typeface="Cambria Math" panose="02040503050406030204" pitchFamily="18" charset="0"/>
                         </a:rPr>
-                        <m:t>𝐹</m:t>
+                        <m:t>𝑓</m:t>
                       </m:r>
                       <m:d>
                         <m:dPr>
@@ -7207,7 +8040,7 @@
                             <a:rPr lang="en-US" b="0" i="1" smtClean="0">
                               <a:latin typeface="Cambria Math" panose="02040503050406030204" pitchFamily="18" charset="0"/>
                             </a:rPr>
-                            <m:t>−11</m:t>
+                            <m:t>+11</m:t>
                           </m:r>
                         </m:e>
                       </m:nary>
@@ -7236,14 +8069,14 @@
             </p:nvSpPr>
             <p:spPr>
               <a:xfrm>
-                <a:off x="919753" y="2607021"/>
-                <a:ext cx="2759345" cy="622799"/>
+                <a:off x="808065" y="2607021"/>
+                <a:ext cx="2742610" cy="622799"/>
               </a:xfrm>
               <a:prstGeom prst="rect">
                 <a:avLst/>
               </a:prstGeom>
               <a:blipFill>
-                <a:blip r:embed="rId2"/>
+                <a:blip r:embed="rId6"/>
                 <a:stretch>
                   <a:fillRect/>
                 </a:stretch>
@@ -7279,7 +8112,7 @@
         <p:spPr>
           <a:xfrm>
             <a:off x="544870" y="3542162"/>
-            <a:ext cx="3524578" cy="1323439"/>
+            <a:ext cx="3524578" cy="1569660"/>
           </a:xfrm>
           <a:prstGeom prst="rect">
             <a:avLst/>
@@ -7302,7 +8135,15 @@
             </a:r>
             <a:r>
               <a:rPr lang="en-US" sz="1600" dirty="0"/>
-              <a:t>() that while using the midpoint rule will ensure that the maximum slope of any given interval on the curve will be less than </a:t>
+              <a:t>() that, while using the midpoint area, will ensure that the maximum </a:t>
+            </a:r>
+            <a:r>
+              <a:rPr lang="en-US" sz="1600" i="1" dirty="0"/>
+              <a:t>change</a:t>
+            </a:r>
+            <a:r>
+              <a:rPr lang="en-US" sz="1600" dirty="0"/>
+              <a:t> in the function value between the left and right side of any interval is under the limit of </a:t>
             </a:r>
             <a:r>
               <a:rPr lang="en-US" sz="1600" b="1" dirty="0"/>
@@ -7311,527 +8152,367 @@
           </a:p>
         </p:txBody>
       </p:sp>
-      <p:grpSp>
-        <p:nvGrpSpPr>
-          <p:cNvPr id="32" name="Group 31">
-            <a:extLst>
-              <a:ext uri="{FF2B5EF4-FFF2-40B4-BE49-F238E27FC236}">
-                <a16:creationId xmlns:a16="http://schemas.microsoft.com/office/drawing/2014/main" id="{41A5C10D-D626-439C-B95D-1BC7AF098660}"/>
-              </a:ext>
-            </a:extLst>
-          </p:cNvPr>
-          <p:cNvGrpSpPr/>
-          <p:nvPr/>
-        </p:nvGrpSpPr>
-        <p:grpSpPr>
-          <a:xfrm>
-            <a:off x="4491279" y="1345059"/>
-            <a:ext cx="3130320" cy="2778211"/>
-            <a:chOff x="4491279" y="1345059"/>
-            <a:chExt cx="3130320" cy="2778211"/>
-          </a:xfrm>
-        </p:grpSpPr>
-        <p:pic>
-          <p:nvPicPr>
-            <p:cNvPr id="5" name="Picture 4">
-              <a:extLst>
-                <a:ext uri="{FF2B5EF4-FFF2-40B4-BE49-F238E27FC236}">
-                  <a16:creationId xmlns:a16="http://schemas.microsoft.com/office/drawing/2014/main" id="{A46ECFDE-0364-4174-96FC-04347BB101E3}"/>
-                </a:ext>
-              </a:extLst>
-            </p:cNvPr>
-            <p:cNvPicPr>
-              <a:picLocks noChangeAspect="1"/>
-            </p:cNvPicPr>
-            <p:nvPr/>
-          </p:nvPicPr>
-          <p:blipFill>
-            <a:blip r:embed="rId3"/>
-            <a:stretch>
-              <a:fillRect/>
-            </a:stretch>
-          </p:blipFill>
-          <p:spPr>
-            <a:xfrm>
-              <a:off x="4491279" y="1646582"/>
-              <a:ext cx="3130320" cy="1920878"/>
-            </a:xfrm>
-            <a:prstGeom prst="rect">
-              <a:avLst/>
-            </a:prstGeom>
-          </p:spPr>
-        </p:pic>
-        <p:cxnSp>
-          <p:nvCxnSpPr>
-            <p:cNvPr id="7" name="Straight Connector 6">
-              <a:extLst>
-                <a:ext uri="{FF2B5EF4-FFF2-40B4-BE49-F238E27FC236}">
-                  <a16:creationId xmlns:a16="http://schemas.microsoft.com/office/drawing/2014/main" id="{A36CEFC8-D716-4724-91F5-D5C322689B3F}"/>
-                </a:ext>
-              </a:extLst>
-            </p:cNvPr>
-            <p:cNvCxnSpPr>
-              <a:cxnSpLocks/>
-            </p:cNvCxnSpPr>
-            <p:nvPr/>
-          </p:nvCxnSpPr>
-          <p:spPr>
-            <a:xfrm>
-              <a:off x="5460142" y="2883694"/>
-              <a:ext cx="0" cy="495299"/>
-            </a:xfrm>
-            <a:prstGeom prst="line">
-              <a:avLst/>
-            </a:prstGeom>
-            <a:ln w="12700">
-              <a:solidFill>
-                <a:schemeClr val="tx1"/>
-              </a:solidFill>
-              <a:prstDash val="solid"/>
-            </a:ln>
-          </p:spPr>
-          <p:style>
-            <a:lnRef idx="1">
-              <a:schemeClr val="accent1"/>
-            </a:lnRef>
-            <a:fillRef idx="0">
-              <a:schemeClr val="accent1"/>
-            </a:fillRef>
-            <a:effectRef idx="0">
-              <a:schemeClr val="accent1"/>
-            </a:effectRef>
-            <a:fontRef idx="minor">
-              <a:schemeClr val="tx1"/>
-            </a:fontRef>
-          </p:style>
-        </p:cxnSp>
-        <p:cxnSp>
-          <p:nvCxnSpPr>
-            <p:cNvPr id="13" name="Straight Connector 12">
-              <a:extLst>
-                <a:ext uri="{FF2B5EF4-FFF2-40B4-BE49-F238E27FC236}">
-                  <a16:creationId xmlns:a16="http://schemas.microsoft.com/office/drawing/2014/main" id="{AB847FE3-5855-4FEF-86DA-7DFF52E9481B}"/>
-                </a:ext>
-              </a:extLst>
-            </p:cNvPr>
-            <p:cNvCxnSpPr>
-              <a:cxnSpLocks/>
-            </p:cNvCxnSpPr>
-            <p:nvPr/>
-          </p:nvCxnSpPr>
-          <p:spPr>
-            <a:xfrm>
-              <a:off x="7076218" y="2028825"/>
-              <a:ext cx="0" cy="1350168"/>
-            </a:xfrm>
-            <a:prstGeom prst="line">
-              <a:avLst/>
-            </a:prstGeom>
-            <a:ln w="12700">
-              <a:solidFill>
-                <a:srgbClr val="FF0000"/>
-              </a:solidFill>
-              <a:prstDash val="solid"/>
-            </a:ln>
-          </p:spPr>
-          <p:style>
-            <a:lnRef idx="1">
-              <a:schemeClr val="accent1"/>
-            </a:lnRef>
-            <a:fillRef idx="0">
-              <a:schemeClr val="accent1"/>
-            </a:fillRef>
-            <a:effectRef idx="0">
-              <a:schemeClr val="accent1"/>
-            </a:effectRef>
-            <a:fontRef idx="minor">
-              <a:schemeClr val="tx1"/>
-            </a:fontRef>
-          </p:style>
-        </p:cxnSp>
-        <p:cxnSp>
-          <p:nvCxnSpPr>
-            <p:cNvPr id="16" name="Straight Connector 15">
-              <a:extLst>
-                <a:ext uri="{FF2B5EF4-FFF2-40B4-BE49-F238E27FC236}">
-                  <a16:creationId xmlns:a16="http://schemas.microsoft.com/office/drawing/2014/main" id="{1949B656-A905-4EB2-B102-C55B6AD52ABD}"/>
-                </a:ext>
-              </a:extLst>
-            </p:cNvPr>
-            <p:cNvCxnSpPr>
-              <a:cxnSpLocks/>
-            </p:cNvCxnSpPr>
-            <p:nvPr/>
-          </p:nvCxnSpPr>
-          <p:spPr>
-            <a:xfrm flipV="1">
-              <a:off x="5460142" y="2028825"/>
-              <a:ext cx="1616076" cy="854869"/>
-            </a:xfrm>
-            <a:prstGeom prst="line">
-              <a:avLst/>
-            </a:prstGeom>
-            <a:ln w="12700">
-              <a:solidFill>
-                <a:srgbClr val="FF0000"/>
-              </a:solidFill>
-              <a:prstDash val="solid"/>
-            </a:ln>
-          </p:spPr>
-          <p:style>
-            <a:lnRef idx="1">
-              <a:schemeClr val="accent1"/>
-            </a:lnRef>
-            <a:fillRef idx="0">
-              <a:schemeClr val="accent1"/>
-            </a:fillRef>
-            <a:effectRef idx="0">
-              <a:schemeClr val="accent1"/>
-            </a:effectRef>
-            <a:fontRef idx="minor">
-              <a:schemeClr val="tx1"/>
-            </a:fontRef>
-          </p:style>
-        </p:cxnSp>
-        <p:cxnSp>
-          <p:nvCxnSpPr>
-            <p:cNvPr id="19" name="Straight Connector 18">
-              <a:extLst>
-                <a:ext uri="{FF2B5EF4-FFF2-40B4-BE49-F238E27FC236}">
-                  <a16:creationId xmlns:a16="http://schemas.microsoft.com/office/drawing/2014/main" id="{FB683B0F-674C-4C36-802F-2FA3FF16226B}"/>
-                </a:ext>
-              </a:extLst>
-            </p:cNvPr>
-            <p:cNvCxnSpPr>
-              <a:cxnSpLocks/>
-            </p:cNvCxnSpPr>
-            <p:nvPr/>
-          </p:nvCxnSpPr>
-          <p:spPr>
-            <a:xfrm>
-              <a:off x="5730018" y="2797175"/>
-              <a:ext cx="0" cy="581818"/>
-            </a:xfrm>
-            <a:prstGeom prst="line">
-              <a:avLst/>
-            </a:prstGeom>
-            <a:ln w="12700">
-              <a:solidFill>
-                <a:srgbClr val="7030A0"/>
-              </a:solidFill>
-              <a:prstDash val="solid"/>
-            </a:ln>
-          </p:spPr>
-          <p:style>
-            <a:lnRef idx="1">
-              <a:schemeClr val="accent1"/>
-            </a:lnRef>
-            <a:fillRef idx="0">
-              <a:schemeClr val="accent1"/>
-            </a:fillRef>
-            <a:effectRef idx="0">
-              <a:schemeClr val="accent1"/>
-            </a:effectRef>
-            <a:fontRef idx="minor">
-              <a:schemeClr val="tx1"/>
-            </a:fontRef>
-          </p:style>
-        </p:cxnSp>
-        <p:cxnSp>
-          <p:nvCxnSpPr>
-            <p:cNvPr id="21" name="Straight Connector 20">
-              <a:extLst>
-                <a:ext uri="{FF2B5EF4-FFF2-40B4-BE49-F238E27FC236}">
-                  <a16:creationId xmlns:a16="http://schemas.microsoft.com/office/drawing/2014/main" id="{FE327309-D1CE-4011-9C3E-39A22C696283}"/>
-                </a:ext>
-              </a:extLst>
-            </p:cNvPr>
-            <p:cNvCxnSpPr>
-              <a:cxnSpLocks/>
-            </p:cNvCxnSpPr>
-            <p:nvPr/>
-          </p:nvCxnSpPr>
-          <p:spPr>
-            <a:xfrm flipV="1">
-              <a:off x="5460141" y="2803126"/>
-              <a:ext cx="269877" cy="80568"/>
-            </a:xfrm>
-            <a:prstGeom prst="line">
-              <a:avLst/>
-            </a:prstGeom>
-            <a:ln w="12700">
-              <a:solidFill>
-                <a:srgbClr val="7030A0"/>
-              </a:solidFill>
-              <a:prstDash val="solid"/>
-            </a:ln>
-          </p:spPr>
-          <p:style>
-            <a:lnRef idx="1">
-              <a:schemeClr val="accent1"/>
-            </a:lnRef>
-            <a:fillRef idx="0">
-              <a:schemeClr val="accent1"/>
-            </a:fillRef>
-            <a:effectRef idx="0">
-              <a:schemeClr val="accent1"/>
-            </a:effectRef>
-            <a:fontRef idx="minor">
-              <a:schemeClr val="tx1"/>
-            </a:fontRef>
-          </p:style>
-        </p:cxnSp>
-        <mc:AlternateContent xmlns:mc="http://schemas.openxmlformats.org/markup-compatibility/2006" xmlns:a14="http://schemas.microsoft.com/office/drawing/2010/main">
-          <mc:Choice Requires="a14">
-            <p:sp>
-              <p:nvSpPr>
-                <p:cNvPr id="29" name="Speech Bubble: Rectangle 28">
-                  <a:extLst>
-                    <a:ext uri="{FF2B5EF4-FFF2-40B4-BE49-F238E27FC236}">
-                      <a16:creationId xmlns:a16="http://schemas.microsoft.com/office/drawing/2014/main" id="{4350F087-342D-4D1B-A736-80DAFF9BBB7E}"/>
-                    </a:ext>
-                  </a:extLst>
-                </p:cNvPr>
-                <p:cNvSpPr/>
-                <p:nvPr/>
-              </p:nvSpPr>
-              <p:spPr>
-                <a:xfrm>
-                  <a:off x="5178615" y="1345059"/>
-                  <a:ext cx="1616068" cy="611689"/>
-                </a:xfrm>
-                <a:prstGeom prst="wedgeRectCallout">
-                  <a:avLst>
-                    <a:gd name="adj1" fmla="val 14474"/>
-                    <a:gd name="adj2" fmla="val 131862"/>
-                  </a:avLst>
-                </a:prstGeom>
-              </p:spPr>
-              <p:style>
-                <a:lnRef idx="2">
-                  <a:schemeClr val="accent1">
-                    <a:shade val="50000"/>
-                  </a:schemeClr>
-                </a:lnRef>
-                <a:fillRef idx="1">
-                  <a:schemeClr val="accent1"/>
-                </a:fillRef>
-                <a:effectRef idx="0">
-                  <a:schemeClr val="accent1"/>
-                </a:effectRef>
-                <a:fontRef idx="minor">
-                  <a:schemeClr val="lt1"/>
-                </a:fontRef>
-              </p:style>
-              <p:txBody>
-                <a:bodyPr rtlCol="0" anchor="ctr"/>
-                <a:lstStyle/>
-                <a:p>
-                  <a:pPr algn="ctr"/>
-                  <a:r>
-                    <a:rPr lang="en-US" sz="1200" dirty="0"/>
-                    <a:t>The </a:t>
-                  </a:r>
-                  <a14:m>
+      <mc:AlternateContent xmlns:mc="http://schemas.openxmlformats.org/markup-compatibility/2006">
+        <mc:Choice xmlns:a14="http://schemas.microsoft.com/office/drawing/2010/main" Requires="a14">
+          <p:sp>
+            <p:nvSpPr>
+              <p:cNvPr id="29" name="Speech Bubble: Rectangle 28">
+                <a:extLst>
+                  <a:ext uri="{FF2B5EF4-FFF2-40B4-BE49-F238E27FC236}">
+                    <a16:creationId xmlns:a16="http://schemas.microsoft.com/office/drawing/2014/main" id="{4350F087-342D-4D1B-A736-80DAFF9BBB7E}"/>
+                  </a:ext>
+                </a:extLst>
+              </p:cNvPr>
+              <p:cNvSpPr/>
+              <p:nvPr/>
+            </p:nvSpPr>
+            <p:spPr>
+              <a:xfrm>
+                <a:off x="7486650" y="1822437"/>
+                <a:ext cx="1442930" cy="663127"/>
+              </a:xfrm>
+              <a:prstGeom prst="wedgeRectCallout">
+                <a:avLst>
+                  <a:gd name="adj1" fmla="val -72397"/>
+                  <a:gd name="adj2" fmla="val 37903"/>
+                </a:avLst>
+              </a:prstGeom>
+            </p:spPr>
+            <p:style>
+              <a:lnRef idx="2">
+                <a:schemeClr val="accent1">
+                  <a:shade val="50000"/>
+                </a:schemeClr>
+              </a:lnRef>
+              <a:fillRef idx="1">
+                <a:schemeClr val="accent1"/>
+              </a:fillRef>
+              <a:effectRef idx="0">
+                <a:schemeClr val="accent1"/>
+              </a:effectRef>
+              <a:fontRef idx="minor">
+                <a:schemeClr val="lt1"/>
+              </a:fontRef>
+            </p:style>
+            <p:txBody>
+              <a:bodyPr rtlCol="0" anchor="ctr"/>
+              <a:lstStyle/>
+              <a:p>
+                <a:pPr algn="ctr"/>
+                <a:r>
+                  <a:rPr lang="en-US" sz="1200" dirty="0"/>
+                  <a:t>This large </a:t>
+                </a:r>
+                <a14:m>
+                  <m:oMath xmlns:m="http://schemas.openxmlformats.org/officeDocument/2006/math">
+                    <m:r>
+                      <a:rPr lang="en-US" sz="1200" i="1" smtClean="0">
+                        <a:latin typeface="Cambria Math" panose="02040503050406030204" pitchFamily="18" charset="0"/>
+                        <a:ea typeface="Cambria Math" panose="02040503050406030204" pitchFamily="18" charset="0"/>
+                      </a:rPr>
+                      <m:t>∆</m:t>
+                    </m:r>
+                    <m:r>
+                      <a:rPr lang="en-US" sz="1200" b="0" i="1" smtClean="0">
+                        <a:latin typeface="Cambria Math" panose="02040503050406030204" pitchFamily="18" charset="0"/>
+                        <a:ea typeface="Cambria Math" panose="02040503050406030204" pitchFamily="18" charset="0"/>
+                      </a:rPr>
+                      <m:t>𝑥</m:t>
+                    </m:r>
+                  </m:oMath>
+                </a14:m>
+                <a:r>
+                  <a:rPr lang="en-US" sz="1200" dirty="0"/>
+                  <a:t> makes</a:t>
+                </a:r>
+                <a:endParaRPr lang="en-US" sz="1200" i="1" dirty="0">
+                  <a:latin typeface="Cambria Math" panose="02040503050406030204" pitchFamily="18" charset="0"/>
+                </a:endParaRPr>
+              </a:p>
+              <a:p>
+                <a:pPr algn="ctr"/>
+                <a14:m>
+                  <m:oMathPara xmlns:m="http://schemas.openxmlformats.org/officeDocument/2006/math">
+                    <m:oMathParaPr>
+                      <m:jc m:val="centerGroup"/>
+                    </m:oMathParaPr>
                     <m:oMath xmlns:m="http://schemas.openxmlformats.org/officeDocument/2006/math">
-                      <m:r>
-                        <a:rPr lang="en-US" sz="1200" i="1" smtClean="0">
-                          <a:latin typeface="Cambria Math" panose="02040503050406030204" pitchFamily="18" charset="0"/>
-                          <a:ea typeface="Cambria Math" panose="02040503050406030204" pitchFamily="18" charset="0"/>
-                        </a:rPr>
-                        <m:t>∆</m:t>
-                      </m:r>
-                      <m:r>
-                        <a:rPr lang="en-US" sz="1200" b="0" i="1" smtClean="0">
-                          <a:latin typeface="Cambria Math" panose="02040503050406030204" pitchFamily="18" charset="0"/>
-                          <a:ea typeface="Cambria Math" panose="02040503050406030204" pitchFamily="18" charset="0"/>
-                        </a:rPr>
-                        <m:t>𝑥</m:t>
-                      </m:r>
+                      <m:d>
+                        <m:dPr>
+                          <m:begChr m:val="|"/>
+                          <m:endChr m:val="|"/>
+                          <m:ctrlPr>
+                            <a:rPr lang="en-US" sz="1200" i="1" smtClean="0">
+                              <a:latin typeface="Cambria Math" panose="02040503050406030204" pitchFamily="18" charset="0"/>
+                            </a:rPr>
+                          </m:ctrlPr>
+                        </m:dPr>
+                        <m:e>
+                          <m:r>
+                            <a:rPr lang="en-US" sz="1200" b="0" i="1" smtClean="0">
+                              <a:latin typeface="Cambria Math" panose="02040503050406030204" pitchFamily="18" charset="0"/>
+                            </a:rPr>
+                            <m:t>𝑓</m:t>
+                          </m:r>
+                          <m:d>
+                            <m:dPr>
+                              <m:ctrlPr>
+                                <a:rPr lang="en-US" sz="1200" b="0" i="1" smtClean="0">
+                                  <a:latin typeface="Cambria Math" panose="02040503050406030204" pitchFamily="18" charset="0"/>
+                                </a:rPr>
+                              </m:ctrlPr>
+                            </m:dPr>
+                            <m:e>
+                              <m:r>
+                                <a:rPr lang="en-US" sz="1200" b="0" i="1" smtClean="0">
+                                  <a:latin typeface="Cambria Math" panose="02040503050406030204" pitchFamily="18" charset="0"/>
+                                </a:rPr>
+                                <m:t>𝑥</m:t>
+                              </m:r>
+                              <m:r>
+                                <a:rPr lang="en-US" sz="1200" b="0" i="1" smtClean="0">
+                                  <a:latin typeface="Cambria Math" panose="02040503050406030204" pitchFamily="18" charset="0"/>
+                                </a:rPr>
+                                <m:t>+</m:t>
+                              </m:r>
+                              <m:r>
+                                <m:rPr>
+                                  <m:sty m:val="p"/>
+                                </m:rPr>
+                                <a:rPr lang="el-GR" sz="1200" b="0" i="1" smtClean="0">
+                                  <a:latin typeface="Cambria Math" panose="02040503050406030204" pitchFamily="18" charset="0"/>
+                                  <a:ea typeface="Cambria Math" panose="02040503050406030204" pitchFamily="18" charset="0"/>
+                                </a:rPr>
+                                <m:t>Δ</m:t>
+                              </m:r>
+                              <m:r>
+                                <a:rPr lang="en-US" sz="1200" b="0" i="1" smtClean="0">
+                                  <a:latin typeface="Cambria Math" panose="02040503050406030204" pitchFamily="18" charset="0"/>
+                                  <a:ea typeface="Cambria Math" panose="02040503050406030204" pitchFamily="18" charset="0"/>
+                                </a:rPr>
+                                <m:t>𝑥</m:t>
+                              </m:r>
+                            </m:e>
+                          </m:d>
+                          <m:r>
+                            <a:rPr lang="en-US" sz="1200" b="0" i="1" smtClean="0">
+                              <a:latin typeface="Cambria Math" panose="02040503050406030204" pitchFamily="18" charset="0"/>
+                            </a:rPr>
+                            <m:t>−</m:t>
+                          </m:r>
+                          <m:r>
+                            <a:rPr lang="en-US" sz="1200" b="0" i="1" smtClean="0">
+                              <a:latin typeface="Cambria Math" panose="02040503050406030204" pitchFamily="18" charset="0"/>
+                            </a:rPr>
+                            <m:t>𝑓</m:t>
+                          </m:r>
+                          <m:d>
+                            <m:dPr>
+                              <m:ctrlPr>
+                                <a:rPr lang="en-US" sz="1200" b="0" i="1" smtClean="0">
+                                  <a:latin typeface="Cambria Math" panose="02040503050406030204" pitchFamily="18" charset="0"/>
+                                </a:rPr>
+                              </m:ctrlPr>
+                            </m:dPr>
+                            <m:e>
+                              <m:r>
+                                <a:rPr lang="en-US" sz="1200" b="0" i="1" smtClean="0">
+                                  <a:latin typeface="Cambria Math" panose="02040503050406030204" pitchFamily="18" charset="0"/>
+                                </a:rPr>
+                                <m:t>𝑥</m:t>
+                              </m:r>
+                            </m:e>
+                          </m:d>
+                        </m:e>
+                      </m:d>
                     </m:oMath>
-                  </a14:m>
-                  <a:r>
-                    <a:rPr lang="en-US" sz="1200" dirty="0"/>
-                    <a:t> for this interval is too wide as it makes the slope too great</a:t>
-                  </a:r>
-                </a:p>
-              </p:txBody>
-            </p:sp>
-          </mc:Choice>
-          <mc:Fallback xmlns="">
-            <p:sp>
-              <p:nvSpPr>
-                <p:cNvPr id="29" name="Speech Bubble: Rectangle 28">
-                  <a:extLst>
-                    <a:ext uri="{FF2B5EF4-FFF2-40B4-BE49-F238E27FC236}">
-                      <a16:creationId xmlns:a16="http://schemas.microsoft.com/office/drawing/2014/main" id="{4350F087-342D-4D1B-A736-80DAFF9BBB7E}"/>
-                    </a:ext>
-                  </a:extLst>
-                </p:cNvPr>
-                <p:cNvSpPr>
-                  <a:spLocks noRot="1" noChangeAspect="1" noMove="1" noResize="1" noEditPoints="1" noAdjustHandles="1" noChangeArrowheads="1" noChangeShapeType="1" noTextEdit="1"/>
-                </p:cNvSpPr>
-                <p:nvPr/>
-              </p:nvSpPr>
-              <p:spPr>
-                <a:xfrm>
-                  <a:off x="5178615" y="1345059"/>
-                  <a:ext cx="1616068" cy="611689"/>
-                </a:xfrm>
-                <a:prstGeom prst="wedgeRectCallout">
-                  <a:avLst>
-                    <a:gd name="adj1" fmla="val 14474"/>
-                    <a:gd name="adj2" fmla="val 131862"/>
-                  </a:avLst>
-                </a:prstGeom>
-                <a:blipFill>
-                  <a:blip r:embed="rId4"/>
-                  <a:stretch>
-                    <a:fillRect t="-1075" r="-1124"/>
-                  </a:stretch>
-                </a:blipFill>
-              </p:spPr>
-              <p:txBody>
-                <a:bodyPr/>
-                <a:lstStyle/>
-                <a:p>
-                  <a:r>
-                    <a:rPr lang="en-US">
-                      <a:noFill/>
-                    </a:rPr>
-                    <a:t> </a:t>
-                  </a:r>
-                </a:p>
-              </p:txBody>
-            </p:sp>
-          </mc:Fallback>
-        </mc:AlternateContent>
-        <mc:AlternateContent xmlns:mc="http://schemas.openxmlformats.org/markup-compatibility/2006" xmlns:a14="http://schemas.microsoft.com/office/drawing/2010/main">
-          <mc:Choice Requires="a14">
-            <p:sp>
-              <p:nvSpPr>
-                <p:cNvPr id="30" name="Speech Bubble: Rectangle 29">
-                  <a:extLst>
-                    <a:ext uri="{FF2B5EF4-FFF2-40B4-BE49-F238E27FC236}">
-                      <a16:creationId xmlns:a16="http://schemas.microsoft.com/office/drawing/2014/main" id="{346598F6-40D9-4E38-AFD8-1B799FB2C53A}"/>
-                    </a:ext>
-                  </a:extLst>
-                </p:cNvPr>
-                <p:cNvSpPr/>
-                <p:nvPr/>
-              </p:nvSpPr>
-              <p:spPr>
-                <a:xfrm>
-                  <a:off x="5391455" y="3715324"/>
-                  <a:ext cx="2057400" cy="407946"/>
-                </a:xfrm>
-                <a:prstGeom prst="wedgeRectCallout">
-                  <a:avLst>
-                    <a:gd name="adj1" fmla="val -39424"/>
-                    <a:gd name="adj2" fmla="val -118677"/>
-                  </a:avLst>
-                </a:prstGeom>
-              </p:spPr>
-              <p:style>
-                <a:lnRef idx="2">
-                  <a:schemeClr val="accent1">
-                    <a:shade val="50000"/>
-                  </a:schemeClr>
-                </a:lnRef>
-                <a:fillRef idx="1">
-                  <a:schemeClr val="accent1"/>
-                </a:fillRef>
-                <a:effectRef idx="0">
-                  <a:schemeClr val="accent1"/>
-                </a:effectRef>
-                <a:fontRef idx="minor">
-                  <a:schemeClr val="lt1"/>
-                </a:fontRef>
-              </p:style>
-              <p:txBody>
-                <a:bodyPr rtlCol="0" anchor="ctr"/>
-                <a:lstStyle/>
-                <a:p>
-                  <a:pPr algn="ctr"/>
-                  <a:r>
-                    <a:rPr lang="en-US" sz="1200" dirty="0"/>
-                    <a:t>So we need to reduce the </a:t>
-                  </a:r>
-                  <a14:m>
-                    <m:oMath xmlns:m="http://schemas.openxmlformats.org/officeDocument/2006/math">
-                      <m:r>
-                        <a:rPr lang="en-US" sz="1200" i="1" smtClean="0">
-                          <a:latin typeface="Cambria Math" panose="02040503050406030204" pitchFamily="18" charset="0"/>
-                          <a:ea typeface="Cambria Math" panose="02040503050406030204" pitchFamily="18" charset="0"/>
-                        </a:rPr>
-                        <m:t>∆</m:t>
-                      </m:r>
-                      <m:r>
-                        <a:rPr lang="en-US" sz="1200" b="0" i="1" smtClean="0">
-                          <a:latin typeface="Cambria Math" panose="02040503050406030204" pitchFamily="18" charset="0"/>
-                          <a:ea typeface="Cambria Math" panose="02040503050406030204" pitchFamily="18" charset="0"/>
-                        </a:rPr>
-                        <m:t>𝑥</m:t>
-                      </m:r>
-                    </m:oMath>
-                  </a14:m>
-                  <a:r>
-                    <a:rPr lang="en-US" sz="1200" dirty="0"/>
-                    <a:t> to keep the slope under .001</a:t>
-                  </a:r>
-                </a:p>
-              </p:txBody>
-            </p:sp>
-          </mc:Choice>
-          <mc:Fallback xmlns="">
-            <p:sp>
-              <p:nvSpPr>
-                <p:cNvPr id="30" name="Speech Bubble: Rectangle 29">
-                  <a:extLst>
-                    <a:ext uri="{FF2B5EF4-FFF2-40B4-BE49-F238E27FC236}">
-                      <a16:creationId xmlns:a16="http://schemas.microsoft.com/office/drawing/2014/main" id="{346598F6-40D9-4E38-AFD8-1B799FB2C53A}"/>
-                    </a:ext>
-                  </a:extLst>
-                </p:cNvPr>
-                <p:cNvSpPr>
-                  <a:spLocks noRot="1" noChangeAspect="1" noMove="1" noResize="1" noEditPoints="1" noAdjustHandles="1" noChangeArrowheads="1" noChangeShapeType="1" noTextEdit="1"/>
-                </p:cNvSpPr>
-                <p:nvPr/>
-              </p:nvSpPr>
-              <p:spPr>
-                <a:xfrm>
-                  <a:off x="5391455" y="3715324"/>
-                  <a:ext cx="2057400" cy="407946"/>
-                </a:xfrm>
-                <a:prstGeom prst="wedgeRectCallout">
-                  <a:avLst>
-                    <a:gd name="adj1" fmla="val -39424"/>
-                    <a:gd name="adj2" fmla="val -118677"/>
-                  </a:avLst>
-                </a:prstGeom>
-                <a:blipFill>
-                  <a:blip r:embed="rId5"/>
-                  <a:stretch>
-                    <a:fillRect b="-9483"/>
-                  </a:stretch>
-                </a:blipFill>
-              </p:spPr>
-              <p:txBody>
-                <a:bodyPr/>
-                <a:lstStyle/>
-                <a:p>
-                  <a:r>
-                    <a:rPr lang="en-US">
-                      <a:noFill/>
-                    </a:rPr>
-                    <a:t> </a:t>
-                  </a:r>
-                </a:p>
-              </p:txBody>
-            </p:sp>
-          </mc:Fallback>
-        </mc:AlternateContent>
-      </p:grpSp>
+                  </m:oMathPara>
+                </a14:m>
+                <a:endParaRPr lang="en-US" sz="1200" dirty="0"/>
+              </a:p>
+              <a:p>
+                <a:pPr algn="ctr"/>
+                <a:r>
+                  <a:rPr lang="en-US" sz="1200" dirty="0"/>
+                  <a:t>exceed the limit</a:t>
+                </a:r>
+              </a:p>
+            </p:txBody>
+          </p:sp>
+        </mc:Choice>
+        <mc:Fallback>
+          <p:sp>
+            <p:nvSpPr>
+              <p:cNvPr id="29" name="Speech Bubble: Rectangle 28">
+                <a:extLst>
+                  <a:ext uri="{FF2B5EF4-FFF2-40B4-BE49-F238E27FC236}">
+                    <a16:creationId xmlns:a16="http://schemas.microsoft.com/office/drawing/2014/main" id="{4350F087-342D-4D1B-A736-80DAFF9BBB7E}"/>
+                  </a:ext>
+                </a:extLst>
+              </p:cNvPr>
+              <p:cNvSpPr>
+                <a:spLocks noRot="1" noChangeAspect="1" noMove="1" noResize="1" noEditPoints="1" noAdjustHandles="1" noChangeArrowheads="1" noChangeShapeType="1" noTextEdit="1"/>
+              </p:cNvSpPr>
+              <p:nvPr/>
+            </p:nvSpPr>
+            <p:spPr>
+              <a:xfrm>
+                <a:off x="7486650" y="1822437"/>
+                <a:ext cx="1442930" cy="663127"/>
+              </a:xfrm>
+              <a:prstGeom prst="wedgeRectCallout">
+                <a:avLst>
+                  <a:gd name="adj1" fmla="val -72397"/>
+                  <a:gd name="adj2" fmla="val 37903"/>
+                </a:avLst>
+              </a:prstGeom>
+              <a:blipFill>
+                <a:blip r:embed="rId7"/>
+                <a:stretch>
+                  <a:fillRect b="-4505"/>
+                </a:stretch>
+              </a:blipFill>
+            </p:spPr>
+            <p:txBody>
+              <a:bodyPr/>
+              <a:lstStyle/>
+              <a:p>
+                <a:r>
+                  <a:rPr lang="en-US">
+                    <a:noFill/>
+                  </a:rPr>
+                  <a:t> </a:t>
+                </a:r>
+              </a:p>
+            </p:txBody>
+          </p:sp>
+        </mc:Fallback>
+      </mc:AlternateContent>
+      <mc:AlternateContent xmlns:mc="http://schemas.openxmlformats.org/markup-compatibility/2006">
+        <mc:Choice xmlns:a14="http://schemas.microsoft.com/office/drawing/2010/main" Requires="a14">
+          <p:sp>
+            <p:nvSpPr>
+              <p:cNvPr id="30" name="Speech Bubble: Rectangle 29">
+                <a:extLst>
+                  <a:ext uri="{FF2B5EF4-FFF2-40B4-BE49-F238E27FC236}">
+                    <a16:creationId xmlns:a16="http://schemas.microsoft.com/office/drawing/2014/main" id="{346598F6-40D9-4E38-AFD8-1B799FB2C53A}"/>
+                  </a:ext>
+                </a:extLst>
+              </p:cNvPr>
+              <p:cNvSpPr/>
+              <p:nvPr/>
+            </p:nvSpPr>
+            <p:spPr>
+              <a:xfrm>
+                <a:off x="5514608" y="3752026"/>
+                <a:ext cx="2294664" cy="643439"/>
+              </a:xfrm>
+              <a:prstGeom prst="wedgeRectCallout">
+                <a:avLst>
+                  <a:gd name="adj1" fmla="val -21461"/>
+                  <a:gd name="adj2" fmla="val -182487"/>
+                </a:avLst>
+              </a:prstGeom>
+            </p:spPr>
+            <p:style>
+              <a:lnRef idx="2">
+                <a:schemeClr val="accent1">
+                  <a:shade val="50000"/>
+                </a:schemeClr>
+              </a:lnRef>
+              <a:fillRef idx="1">
+                <a:schemeClr val="accent1"/>
+              </a:fillRef>
+              <a:effectRef idx="0">
+                <a:schemeClr val="accent1"/>
+              </a:effectRef>
+              <a:fontRef idx="minor">
+                <a:schemeClr val="lt1"/>
+              </a:fontRef>
+            </p:style>
+            <p:txBody>
+              <a:bodyPr rtlCol="0" anchor="ctr"/>
+              <a:lstStyle/>
+              <a:p>
+                <a:pPr algn="ctr"/>
+                <a:r>
+                  <a:rPr lang="en-US" sz="1200" dirty="0"/>
+                  <a:t>We need to reduce </a:t>
+                </a:r>
+                <a14:m>
+                  <m:oMath xmlns:m="http://schemas.openxmlformats.org/officeDocument/2006/math">
+                    <m:r>
+                      <a:rPr lang="en-US" sz="1200" i="1" smtClean="0">
+                        <a:latin typeface="Cambria Math" panose="02040503050406030204" pitchFamily="18" charset="0"/>
+                        <a:ea typeface="Cambria Math" panose="02040503050406030204" pitchFamily="18" charset="0"/>
+                      </a:rPr>
+                      <m:t>∆</m:t>
+                    </m:r>
+                    <m:r>
+                      <a:rPr lang="en-US" sz="1200" b="0" i="1" smtClean="0">
+                        <a:latin typeface="Cambria Math" panose="02040503050406030204" pitchFamily="18" charset="0"/>
+                        <a:ea typeface="Cambria Math" panose="02040503050406030204" pitchFamily="18" charset="0"/>
+                      </a:rPr>
+                      <m:t>𝑥</m:t>
+                    </m:r>
+                  </m:oMath>
+                </a14:m>
+                <a:r>
+                  <a:rPr lang="en-US" sz="1200" dirty="0"/>
+                  <a:t> to the keep change in the function value across the interval under .001</a:t>
+                </a:r>
+              </a:p>
+            </p:txBody>
+          </p:sp>
+        </mc:Choice>
+        <mc:Fallback>
+          <p:sp>
+            <p:nvSpPr>
+              <p:cNvPr id="30" name="Speech Bubble: Rectangle 29">
+                <a:extLst>
+                  <a:ext uri="{FF2B5EF4-FFF2-40B4-BE49-F238E27FC236}">
+                    <a16:creationId xmlns:a16="http://schemas.microsoft.com/office/drawing/2014/main" id="{346598F6-40D9-4E38-AFD8-1B799FB2C53A}"/>
+                  </a:ext>
+                </a:extLst>
+              </p:cNvPr>
+              <p:cNvSpPr>
+                <a:spLocks noRot="1" noChangeAspect="1" noMove="1" noResize="1" noEditPoints="1" noAdjustHandles="1" noChangeArrowheads="1" noChangeShapeType="1" noTextEdit="1"/>
+              </p:cNvSpPr>
+              <p:nvPr/>
+            </p:nvSpPr>
+            <p:spPr>
+              <a:xfrm>
+                <a:off x="5514608" y="3752026"/>
+                <a:ext cx="2294664" cy="643439"/>
+              </a:xfrm>
+              <a:prstGeom prst="wedgeRectCallout">
+                <a:avLst>
+                  <a:gd name="adj1" fmla="val -21461"/>
+                  <a:gd name="adj2" fmla="val -182487"/>
+                </a:avLst>
+              </a:prstGeom>
+              <a:blipFill>
+                <a:blip r:embed="rId8"/>
+                <a:stretch>
+                  <a:fillRect r="-529" b="-2789"/>
+                </a:stretch>
+              </a:blipFill>
+            </p:spPr>
+            <p:txBody>
+              <a:bodyPr/>
+              <a:lstStyle/>
+              <a:p>
+                <a:r>
+                  <a:rPr lang="en-US">
+                    <a:noFill/>
+                  </a:rPr>
+                  <a:t> </a:t>
+                </a:r>
+              </a:p>
+            </p:txBody>
+          </p:sp>
+        </mc:Fallback>
+      </mc:AlternateContent>
       <p:sp>
         <p:nvSpPr>
           <p:cNvPr id="31" name="TextBox 30">
@@ -7846,8 +8527,8 @@
         </p:nvSpPr>
         <p:spPr>
           <a:xfrm>
-            <a:off x="544870" y="5032912"/>
-            <a:ext cx="3524578" cy="1077218"/>
+            <a:off x="544870" y="5268902"/>
+            <a:ext cx="3524578" cy="1323439"/>
           </a:xfrm>
           <a:prstGeom prst="rect">
             <a:avLst/>
@@ -7870,7 +8551,7 @@
             </a:r>
             <a:r>
               <a:rPr lang="en-US" sz="1600" dirty="0"/>
-              <a:t>() is set to use 1 million fixed width intervals.  How does the adaptive quadrature compare to this in terms of relative % error?</a:t>
+              <a:t>() is set to use 1 million fixed width intervals.  How does the adaptive quadrature compare in terms of relative % error and overall execution time?</a:t>
             </a:r>
             <a:endParaRPr lang="en-US" sz="1600" b="1" dirty="0"/>
           </a:p>
@@ -7891,14 +8572,14 @@
           <p:nvPr/>
         </p:nvPicPr>
         <p:blipFill>
-          <a:blip r:embed="rId6"/>
+          <a:blip r:embed="rId9"/>
           <a:stretch>
             <a:fillRect/>
           </a:stretch>
         </p:blipFill>
         <p:spPr>
           <a:xfrm>
-            <a:off x="4455710" y="4506192"/>
+            <a:off x="4491313" y="4772841"/>
             <a:ext cx="3624939" cy="1467237"/>
           </a:xfrm>
           <a:prstGeom prst="rect">
@@ -9664,7 +10345,7 @@
                   <a:srgbClr val="7030A0"/>
                 </a:solidFill>
               </a:rPr>
-              <a:t>20 pts</a:t>
+              <a:t>15 pts</a:t>
             </a:r>
           </a:p>
         </p:txBody>

</xml_diff>